<commit_message>
Little changed about references
</commit_message>
<xml_diff>
--- a/slides_UFSCar.pptx
+++ b/slides_UFSCar.pptx
@@ -29,7 +29,6 @@
     <p:sldId id="277" r:id="rId23"/>
     <p:sldId id="278" r:id="rId24"/>
     <p:sldId id="279" r:id="rId25"/>
-    <p:sldId id="280" r:id="rId26"/>
   </p:sldIdLst>
   <p:sldSz cx="9144000" cy="5143500" type="screen16x9"/>
   <p:notesSz cx="6858000" cy="9144000"/>
@@ -3139,7 +3138,7 @@
             </a:pPr>
             <a:r>
               <a:rPr/>
-              <a:t>Seminário UFSCar, Sorocaba</a:t>
+              <a:t>A brief introduction to R and Rstudio</a:t>
             </a:r>
           </a:p>
         </p:txBody>
@@ -3206,7 +3205,7 @@
             </a:pPr>
             <a:r>
               <a:rPr/>
-              <a:t>15 de Março de 2023</a:t>
+              <a:t>March 15th, 2023</a:t>
             </a:r>
           </a:p>
         </p:txBody>
@@ -3353,6 +3352,21 @@
               <a:t>R has its own LaTeX-like documentation format, which is used to supply comprehensive documentation, both on-line in a number of formats and in hardcopy.</a:t>
             </a:r>
           </a:p>
+          <a:p>
+            <a:pPr lvl="0" indent="0" marL="0">
+              <a:buNone/>
+            </a:pPr>
+            <a:r>
+              <a:rPr/>
+              <a:t>Link for more information </a:t>
+            </a:r>
+            <a:r>
+              <a:rPr>
+                <a:hlinkClick r:id="rId2"/>
+              </a:rPr>
+              <a:t>https://www.r-project.org/about.html</a:t>
+            </a:r>
+          </a:p>
         </p:txBody>
       </p:sp>
     </p:spTree>
@@ -3421,19 +3435,23 @@
               <a:buNone/>
             </a:pPr>
             <a:r>
+              <a:rPr/>
+              <a:t>Precompiled binary distributions of the base system and contributed packages, Windows and Mac users most likely want one of these versions of R: - Download R for Linux (Debian, Fedora/Redhat, Ubuntu) - Download R for macOS - Download R for Windows R is part of many Linux distributions, you should check with your Linux package management system in addition to the link above.</a:t>
+            </a:r>
+          </a:p>
+          <a:p>
+            <a:pPr lvl="0" indent="0" marL="0">
+              <a:buNone/>
+            </a:pPr>
+            <a:r>
+              <a:rPr/>
+              <a:t>Link: </a:t>
+            </a:r>
+            <a:r>
               <a:rPr>
                 <a:hlinkClick r:id="rId2"/>
               </a:rPr>
-              <a:t>Link: The Comprehensive R Archive Network</a:t>
-            </a:r>
-          </a:p>
-          <a:p>
-            <a:pPr lvl="0" indent="0" marL="0">
-              <a:buNone/>
-            </a:pPr>
-            <a:r>
-              <a:rPr/>
-              <a:t>Precompiled binary distributions of the base system and contributed packages, Windows and Mac users most likely want one of these versions of R: - Download R for Linux (Debian, Fedora/Redhat, Ubuntu) - Download R for macOS - Download R for Windows R is part of many Linux distributions, you should check with your Linux package management system in addition to the link above.</a:t>
+              <a:t>The Comprehensive R Archive Network</a:t>
             </a:r>
           </a:p>
         </p:txBody>
@@ -3524,6 +3542,25 @@
               <a:t>.</a:t>
             </a:r>
           </a:p>
+          <a:p>
+            <a:pPr lvl="0" indent="0" marL="0">
+              <a:buNone/>
+            </a:pPr>
+            <a:r>
+              <a:rPr b="1"/>
+              <a:t>Download RStudio Desktop</a:t>
+            </a:r>
+            <a:r>
+              <a:rPr/>
+              <a:t> Link: </a:t>
+            </a:r>
+            <a:r>
+              <a:rPr>
+                <a:hlinkClick r:id="rId2"/>
+              </a:rPr>
+              <a:t>RStudio Desktop</a:t>
+            </a:r>
+          </a:p>
         </p:txBody>
       </p:sp>
     </p:spTree>
@@ -3568,7 +3605,7 @@
             </a:pPr>
             <a:r>
               <a:rPr/>
-              <a:t>Download RStudio Desktop</a:t>
+              <a:t>Install Packages from Repositories or Local Files</a:t>
             </a:r>
           </a:p>
         </p:txBody>
@@ -3588,14 +3625,38 @@
           <a:bodyPr/>
           <a:lstStyle/>
           <a:p>
-            <a:pPr lvl="0" indent="0" marL="0">
+            <a:pPr lvl="0" indent="0">
               <a:buNone/>
             </a:pPr>
             <a:r>
               <a:rPr>
-                <a:hlinkClick r:id="rId2"/>
+                <a:solidFill>
+                  <a:srgbClr val="06287E"/>
+                </a:solidFill>
+                <a:latin typeface="Courier"/>
               </a:rPr>
-              <a:t>link: RStudio Desktop</a:t>
+              <a:t>install.packages</a:t>
+            </a:r>
+            <a:r>
+              <a:rPr>
+                <a:latin typeface="Courier"/>
+              </a:rPr>
+              <a:t>(</a:t>
+            </a:r>
+            <a:r>
+              <a:rPr>
+                <a:solidFill>
+                  <a:srgbClr val="4070A0"/>
+                </a:solidFill>
+                <a:latin typeface="Courier"/>
+              </a:rPr>
+              <a:t>"tidyverse"</a:t>
+            </a:r>
+            <a:r>
+              <a:rPr>
+                <a:latin typeface="Courier"/>
+              </a:rPr>
+              <a:t>)</a:t>
             </a:r>
           </a:p>
         </p:txBody>
@@ -3642,7 +3703,7 @@
             </a:pPr>
             <a:r>
               <a:rPr/>
-              <a:t>Install Packages from Repositories or Local Files</a:t>
+              <a:t>Loading/Attaching and Listing of Packages</a:t>
             </a:r>
           </a:p>
         </p:txBody>
@@ -3672,7 +3733,23 @@
                 </a:solidFill>
                 <a:latin typeface="Courier"/>
               </a:rPr>
-              <a:t>install.packages</a:t>
+              <a:t>library</a:t>
+            </a:r>
+            <a:r>
+              <a:rPr>
+                <a:latin typeface="Courier"/>
+              </a:rPr>
+              <a:t>(tidyverse)</a:t>
+            </a:r>
+            <a:br/>
+            <a:r>
+              <a:rPr>
+                <a:solidFill>
+                  <a:srgbClr val="06287E"/>
+                </a:solidFill>
+                <a:latin typeface="Courier"/>
+              </a:rPr>
+              <a:t>citation</a:t>
             </a:r>
             <a:r>
               <a:rPr>
@@ -3740,7 +3817,7 @@
             </a:pPr>
             <a:r>
               <a:rPr/>
-              <a:t>Loading/Attaching and Listing of Packages</a:t>
+              <a:t>List Objects (ggplot2 example)</a:t>
             </a:r>
           </a:p>
         </p:txBody>
@@ -3770,13 +3847,28 @@
                 </a:solidFill>
                 <a:latin typeface="Courier"/>
               </a:rPr>
-              <a:t>library</a:t>
+              <a:t>ls</a:t>
             </a:r>
             <a:r>
               <a:rPr>
                 <a:latin typeface="Courier"/>
               </a:rPr>
-              <a:t>(tidyverse)</a:t>
+              <a:t>(</a:t>
+            </a:r>
+            <a:r>
+              <a:rPr>
+                <a:solidFill>
+                  <a:srgbClr val="4070A0"/>
+                </a:solidFill>
+                <a:latin typeface="Courier"/>
+              </a:rPr>
+              <a:t>"package:ggplot2"</a:t>
+            </a:r>
+            <a:r>
+              <a:rPr>
+                <a:latin typeface="Courier"/>
+              </a:rPr>
+              <a:t>)</a:t>
             </a:r>
             <a:br/>
             <a:r>
@@ -3801,7 +3893,7 @@
                 </a:solidFill>
                 <a:latin typeface="Courier"/>
               </a:rPr>
-              <a:t>"tidyverse"</a:t>
+              <a:t>"ggplot2"</a:t>
             </a:r>
             <a:r>
               <a:rPr>
@@ -3854,135 +3946,6 @@
             </a:pPr>
             <a:r>
               <a:rPr/>
-              <a:t>List Objects (ggplot2 example)</a:t>
-            </a:r>
-          </a:p>
-        </p:txBody>
-      </p:sp>
-      <p:sp>
-        <p:nvSpPr>
-          <p:cNvPr id="3" name="Content Placeholder 2"/>
-          <p:cNvSpPr>
-            <a:spLocks noGrp="1"/>
-          </p:cNvSpPr>
-          <p:nvPr>
-            <p:ph idx="1"/>
-          </p:nvPr>
-        </p:nvSpPr>
-        <p:spPr/>
-        <p:txBody>
-          <a:bodyPr/>
-          <a:lstStyle/>
-          <a:p>
-            <a:pPr lvl="0" indent="0">
-              <a:buNone/>
-            </a:pPr>
-            <a:r>
-              <a:rPr>
-                <a:solidFill>
-                  <a:srgbClr val="06287E"/>
-                </a:solidFill>
-                <a:latin typeface="Courier"/>
-              </a:rPr>
-              <a:t>ls</a:t>
-            </a:r>
-            <a:r>
-              <a:rPr>
-                <a:latin typeface="Courier"/>
-              </a:rPr>
-              <a:t>(</a:t>
-            </a:r>
-            <a:r>
-              <a:rPr>
-                <a:solidFill>
-                  <a:srgbClr val="4070A0"/>
-                </a:solidFill>
-                <a:latin typeface="Courier"/>
-              </a:rPr>
-              <a:t>"package:ggplot2"</a:t>
-            </a:r>
-            <a:r>
-              <a:rPr>
-                <a:latin typeface="Courier"/>
-              </a:rPr>
-              <a:t>)</a:t>
-            </a:r>
-            <a:br/>
-            <a:r>
-              <a:rPr>
-                <a:solidFill>
-                  <a:srgbClr val="06287E"/>
-                </a:solidFill>
-                <a:latin typeface="Courier"/>
-              </a:rPr>
-              <a:t>citation</a:t>
-            </a:r>
-            <a:r>
-              <a:rPr>
-                <a:latin typeface="Courier"/>
-              </a:rPr>
-              <a:t>(</a:t>
-            </a:r>
-            <a:r>
-              <a:rPr>
-                <a:solidFill>
-                  <a:srgbClr val="4070A0"/>
-                </a:solidFill>
-                <a:latin typeface="Courier"/>
-              </a:rPr>
-              <a:t>"ggplot2"</a:t>
-            </a:r>
-            <a:r>
-              <a:rPr>
-                <a:latin typeface="Courier"/>
-              </a:rPr>
-              <a:t>)</a:t>
-            </a:r>
-          </a:p>
-        </p:txBody>
-      </p:sp>
-    </p:spTree>
-  </p:cSld>
-</p:sld>
-</file>
-
-<file path=ppt/slides/slide18.xml><?xml version="1.0" encoding="utf-8"?>
-<p:sld xmlns:a="http://schemas.openxmlformats.org/drawingml/2006/main" xmlns:r="http://schemas.openxmlformats.org/officeDocument/2006/relationships" xmlns:p="http://schemas.openxmlformats.org/presentationml/2006/main">
-  <p:cSld>
-    <p:spTree>
-      <p:nvGrpSpPr>
-        <p:cNvPr id="1" name=""/>
-        <p:cNvGrpSpPr/>
-        <p:nvPr/>
-      </p:nvGrpSpPr>
-      <p:grpSpPr>
-        <a:xfrm>
-          <a:off x="0" y="0"/>
-          <a:ext cx="0" cy="0"/>
-          <a:chOff x="0" y="0"/>
-          <a:chExt cx="0" cy="0"/>
-        </a:xfrm>
-      </p:grpSpPr>
-      <p:sp>
-        <p:nvSpPr>
-          <p:cNvPr id="2" name="Title 1"/>
-          <p:cNvSpPr>
-            <a:spLocks noGrp="1"/>
-          </p:cNvSpPr>
-          <p:nvPr>
-            <p:ph type="title"/>
-          </p:nvPr>
-        </p:nvSpPr>
-        <p:spPr/>
-        <p:txBody>
-          <a:bodyPr/>
-          <a:lstStyle/>
-          <a:p>
-            <a:pPr lvl="0" indent="0" marL="0">
-              <a:buNone/>
-            </a:pPr>
-            <a:r>
-              <a:rPr/>
               <a:t>Example of dplyr R package</a:t>
             </a:r>
           </a:p>
@@ -4073,7 +4036,7 @@
 </p:sld>
 </file>
 
-<file path=ppt/slides/slide19.xml><?xml version="1.0" encoding="utf-8"?>
+<file path=ppt/slides/slide18.xml><?xml version="1.0" encoding="utf-8"?>
 <p:sld xmlns:a="http://schemas.openxmlformats.org/drawingml/2006/main" xmlns:r="http://schemas.openxmlformats.org/officeDocument/2006/relationships" xmlns:p="http://schemas.openxmlformats.org/presentationml/2006/main">
   <p:cSld>
     <p:spTree>
@@ -4259,6 +4222,125 @@
 </p:sld>
 </file>
 
+<file path=ppt/slides/slide19.xml><?xml version="1.0" encoding="utf-8"?>
+<p:sld xmlns:a="http://schemas.openxmlformats.org/drawingml/2006/main" xmlns:r="http://schemas.openxmlformats.org/officeDocument/2006/relationships" xmlns:p="http://schemas.openxmlformats.org/presentationml/2006/main">
+  <p:cSld>
+    <p:spTree>
+      <p:nvGrpSpPr>
+        <p:cNvPr id="1" name=""/>
+        <p:cNvGrpSpPr/>
+        <p:nvPr/>
+      </p:nvGrpSpPr>
+      <p:grpSpPr>
+        <a:xfrm>
+          <a:off x="0" y="0"/>
+          <a:ext cx="0" cy="0"/>
+          <a:chOff x="0" y="0"/>
+          <a:chExt cx="0" cy="0"/>
+        </a:xfrm>
+      </p:grpSpPr>
+      <p:sp>
+        <p:nvSpPr>
+          <p:cNvPr id="2" name="Title 1"/>
+          <p:cNvSpPr>
+            <a:spLocks noGrp="1"/>
+          </p:cNvSpPr>
+          <p:nvPr>
+            <p:ph type="title"/>
+          </p:nvPr>
+        </p:nvSpPr>
+        <p:spPr/>
+        <p:txBody>
+          <a:bodyPr/>
+          <a:lstStyle/>
+          <a:p>
+            <a:pPr lvl="0" indent="0" marL="0">
+              <a:buNone/>
+            </a:pPr>
+            <a:r>
+              <a:rPr/>
+              <a:t>Rmarkdown from Rstudio</a:t>
+            </a:r>
+          </a:p>
+        </p:txBody>
+      </p:sp>
+      <p:sp>
+        <p:nvSpPr>
+          <p:cNvPr id="3" name="Content Placeholder 2"/>
+          <p:cNvSpPr>
+            <a:spLocks noGrp="1"/>
+          </p:cNvSpPr>
+          <p:nvPr>
+            <p:ph idx="1"/>
+          </p:nvPr>
+        </p:nvSpPr>
+        <p:spPr/>
+        <p:txBody>
+          <a:bodyPr/>
+          <a:lstStyle/>
+          <a:p>
+            <a:pPr lvl="0"/>
+            <a:r>
+              <a:rPr/>
+              <a:t>Documents</a:t>
+            </a:r>
+          </a:p>
+          <a:p>
+            <a:pPr lvl="0"/>
+            <a:r>
+              <a:rPr/>
+              <a:t>Interactive Documents</a:t>
+            </a:r>
+          </a:p>
+          <a:p>
+            <a:pPr lvl="0"/>
+            <a:r>
+              <a:rPr/>
+              <a:t>Dashboards</a:t>
+            </a:r>
+          </a:p>
+          <a:p>
+            <a:pPr lvl="0"/>
+            <a:r>
+              <a:rPr/>
+              <a:t>Presentations</a:t>
+            </a:r>
+          </a:p>
+          <a:p>
+            <a:pPr lvl="0"/>
+            <a:r>
+              <a:rPr/>
+              <a:t>Books</a:t>
+            </a:r>
+          </a:p>
+          <a:p>
+            <a:pPr lvl="0"/>
+            <a:r>
+              <a:rPr/>
+              <a:t>Websites</a:t>
+            </a:r>
+          </a:p>
+          <a:p>
+            <a:pPr lvl="0"/>
+            <a:r>
+              <a:rPr/>
+              <a:t>Templates</a:t>
+            </a:r>
+          </a:p>
+          <a:p>
+            <a:pPr lvl="0"/>
+            <a:r>
+              <a:rPr/>
+              <a:t>Package Vignettes</a:t>
+            </a:r>
+          </a:p>
+        </p:txBody>
+      </p:sp>
+    </p:spTree>
+  </p:cSld>
+</p:sld>
+</file>
+
 <file path=ppt/slides/slide2.xml><?xml version="1.0" encoding="utf-8"?>
 <p:sld xmlns:a="http://schemas.openxmlformats.org/drawingml/2006/main" xmlns:r="http://schemas.openxmlformats.org/officeDocument/2006/relationships" xmlns:p="http://schemas.openxmlformats.org/presentationml/2006/main">
   <p:cSld>
@@ -4320,24 +4402,13 @@
               <a:buNone/>
             </a:pPr>
             <a:r>
+              <a:rPr/>
+              <a:t>R is a language and environment for statistical computing and graphics. It is a </a:t>
+            </a:r>
+            <a:r>
               <a:rPr>
                 <a:hlinkClick r:id="rId2"/>
               </a:rPr>
-              <a:t>Link for more information</a:t>
-            </a:r>
-          </a:p>
-          <a:p>
-            <a:pPr lvl="0" indent="0" marL="0">
-              <a:buNone/>
-            </a:pPr>
-            <a:r>
-              <a:rPr/>
-              <a:t>R is a language and environment for statistical computing and graphics. It is a </a:t>
-            </a:r>
-            <a:r>
-              <a:rPr>
-                <a:hlinkClick r:id="rId3"/>
-              </a:rPr>
               <a:t>GNU project</a:t>
             </a:r>
             <a:r>
@@ -4353,7 +4424,7 @@
               <a:t> (formerly AT&amp;T, now Lucent Technologies) by </a:t>
             </a:r>
             <a:r>
-              <a:rPr i="1"/>
+              <a:rPr b="1"/>
               <a:t>John Chambers</a:t>
             </a:r>
             <a:r>
@@ -4405,7 +4476,7 @@
             </a:pPr>
             <a:r>
               <a:rPr/>
-              <a:t>Rmarkdown from Rstudio</a:t>
+              <a:t>Rmarkdown from Rstudio: Examples</a:t>
             </a:r>
           </a:p>
         </p:txBody>
@@ -4425,59 +4496,18 @@
           <a:bodyPr/>
           <a:lstStyle/>
           <a:p>
-            <a:pPr lvl="0"/>
-            <a:r>
-              <a:rPr/>
-              <a:t>Documents</a:t>
-            </a:r>
-          </a:p>
-          <a:p>
-            <a:pPr lvl="0"/>
-            <a:r>
-              <a:rPr/>
-              <a:t>Interactive Documents</a:t>
-            </a:r>
-          </a:p>
-          <a:p>
-            <a:pPr lvl="0"/>
-            <a:r>
-              <a:rPr/>
-              <a:t>Dashboards</a:t>
-            </a:r>
-          </a:p>
-          <a:p>
-            <a:pPr lvl="0"/>
-            <a:r>
-              <a:rPr/>
-              <a:t>Presentations</a:t>
-            </a:r>
-          </a:p>
-          <a:p>
-            <a:pPr lvl="0"/>
-            <a:r>
-              <a:rPr/>
-              <a:t>Books</a:t>
-            </a:r>
-          </a:p>
-          <a:p>
-            <a:pPr lvl="0"/>
-            <a:r>
-              <a:rPr/>
-              <a:t>Websites</a:t>
-            </a:r>
-          </a:p>
-          <a:p>
-            <a:pPr lvl="0"/>
-            <a:r>
-              <a:rPr/>
-              <a:t>Templates</a:t>
-            </a:r>
-          </a:p>
-          <a:p>
-            <a:pPr lvl="0"/>
-            <a:r>
-              <a:rPr/>
-              <a:t>Package Vignettes</a:t>
+            <a:pPr lvl="0" indent="0" marL="0">
+              <a:buNone/>
+            </a:pPr>
+            <a:r>
+              <a:rPr/>
+              <a:t>Check out the range of outputs and formats you can create using R Markdown </a:t>
+            </a:r>
+            <a:r>
+              <a:rPr>
+                <a:hlinkClick r:id="rId2"/>
+              </a:rPr>
+              <a:t>https://rmarkdown.rstudio.com/gallery</a:t>
             </a:r>
           </a:p>
         </p:txBody>
@@ -4524,7 +4554,7 @@
             </a:pPr>
             <a:r>
               <a:rPr/>
-              <a:t>Rmarkdown from Rstudio: Examples</a:t>
+              <a:t>Citation R</a:t>
             </a:r>
           </a:p>
         </p:txBody>
@@ -4548,10 +4578,27 @@
               <a:buNone/>
             </a:pPr>
             <a:r>
-              <a:rPr>
+              <a:rPr/>
+              <a:t>To cite R in publications use:</a:t>
+            </a:r>
+          </a:p>
+          <a:p>
+            <a:pPr lvl="0" indent="0" marL="1270000">
+              <a:buNone/>
+            </a:pPr>
+            <a:r>
+              <a:rPr sz="2000"/>
+              <a:t>R Core Team (2022). R: A language and environment for statistical computing. R Foundation for Statistical Computing, Vienna, Austria. URL </a:t>
+            </a:r>
+            <a:r>
+              <a:rPr sz="2000">
                 <a:hlinkClick r:id="rId2"/>
               </a:rPr>
-              <a:t>Check out the range of outputs and formats you can create using R Markdown</a:t>
+              <a:t>https://www.R-project.org/</a:t>
+            </a:r>
+            <a:r>
+              <a:rPr sz="2000"/>
+              <a:t>.</a:t>
             </a:r>
           </a:p>
         </p:txBody>
@@ -4598,7 +4645,7 @@
             </a:pPr>
             <a:r>
               <a:rPr/>
-              <a:t>Citation R</a:t>
+              <a:t>References: Books</a:t>
             </a:r>
           </a:p>
         </p:txBody>
@@ -4618,31 +4665,63 @@
           <a:bodyPr/>
           <a:lstStyle/>
           <a:p>
-            <a:pPr lvl="0" indent="0" marL="0">
-              <a:buNone/>
+            <a:pPr lvl="0" indent="-342900" marL="342900">
+              <a:buAutoNum type="arabicParenR"/>
             </a:pPr>
             <a:r>
               <a:rPr/>
-              <a:t>To cite R in publications use:</a:t>
-            </a:r>
-          </a:p>
-          <a:p>
-            <a:pPr lvl="0" indent="0" marL="1270000">
-              <a:buNone/>
-            </a:pPr>
-            <a:r>
-              <a:rPr sz="2000"/>
-              <a:t>R Core Team (2022). R: A language and environment for statistical computing. R Foundation for Statistical Computing, Vienna, Austria. URL </a:t>
-            </a:r>
-            <a:r>
-              <a:rPr sz="2000">
+              <a:t>Link: </a:t>
+            </a:r>
+            <a:r>
+              <a:rPr>
                 <a:hlinkClick r:id="rId2"/>
               </a:rPr>
-              <a:t>https://www.R-project.org/</a:t>
-            </a:r>
-            <a:r>
-              <a:rPr sz="2000"/>
-              <a:t>.</a:t>
+              <a:t>ggplot2: elegant graphics for data analysis, Hadley Wickham</a:t>
+            </a:r>
+          </a:p>
+          <a:p>
+            <a:pPr lvl="0" indent="-342900" marL="342900">
+              <a:buAutoNum type="arabicParenR"/>
+            </a:pPr>
+            <a:r>
+              <a:rPr/>
+              <a:t>Link: </a:t>
+            </a:r>
+            <a:r>
+              <a:rPr>
+                <a:hlinkClick r:id="rId3"/>
+              </a:rPr>
+              <a:t>R Programming for Data Science, Roger D. Peng</a:t>
+            </a:r>
+          </a:p>
+          <a:p>
+            <a:pPr lvl="0" indent="-342900" marL="342900">
+              <a:buAutoNum type="arabicParenR"/>
+            </a:pPr>
+            <a:r>
+              <a:rPr/>
+              <a:t>Link: </a:t>
+            </a:r>
+            <a:r>
+              <a:rPr>
+                <a:hlinkClick r:id="rId4"/>
+              </a:rPr>
+              <a:t>R for Data Science, Hadley Wickham e Garrett Grolemund.</a:t>
+            </a:r>
+          </a:p>
+          <a:p>
+            <a:pPr lvl="0" indent="-342900" marL="342900">
+              <a:buAutoNum type="arabicParenR"/>
+            </a:pPr>
+            <a:r>
+              <a:rPr/>
+              <a:t>Link: </a:t>
+            </a:r>
+            <a:r>
+              <a:rPr>
+                <a:hlinkClick r:id="rId5"/>
+              </a:rPr>
+              <a:t>R Graphics Cookbook, Winston Chang</a:t>
             </a:r>
           </a:p>
         </p:txBody>
@@ -4689,7 +4768,7 @@
             </a:pPr>
             <a:r>
               <a:rPr/>
-              <a:t>References: Books</a:t>
+              <a:t>References (links of dplyr, ggplot2 and magrittr)</a:t>
             </a:r>
           </a:p>
         </p:txBody>
@@ -4713,10 +4792,14 @@
               <a:buAutoNum type="arabicParenR"/>
             </a:pPr>
             <a:r>
+              <a:rPr/>
+              <a:t>Link: </a:t>
+            </a:r>
+            <a:r>
               <a:rPr>
                 <a:hlinkClick r:id="rId2"/>
               </a:rPr>
-              <a:t>ggplot2: elegant graphics for data analysis, Hadley Wickham</a:t>
+              <a:t>dplyr of tidyverse</a:t>
             </a:r>
           </a:p>
           <a:p>
@@ -4724,10 +4807,14 @@
               <a:buAutoNum type="arabicParenR"/>
             </a:pPr>
             <a:r>
+              <a:rPr/>
+              <a:t>Link: </a:t>
+            </a:r>
+            <a:r>
               <a:rPr>
                 <a:hlinkClick r:id="rId3"/>
               </a:rPr>
-              <a:t>R Programming for Data Science, Roger D. Peng</a:t>
+              <a:t>ggplot2 of tidyverse</a:t>
             </a:r>
           </a:p>
           <a:p>
@@ -4735,21 +4822,14 @@
               <a:buAutoNum type="arabicParenR"/>
             </a:pPr>
             <a:r>
+              <a:rPr/>
+              <a:t>Link: </a:t>
+            </a:r>
+            <a:r>
               <a:rPr>
                 <a:hlinkClick r:id="rId4"/>
               </a:rPr>
-              <a:t>R for Data Science, Hadley Wickham e Garrett Grolemund.</a:t>
-            </a:r>
-          </a:p>
-          <a:p>
-            <a:pPr lvl="0" indent="-342900" marL="342900">
-              <a:buAutoNum type="arabicParenR"/>
-            </a:pPr>
-            <a:r>
-              <a:rPr>
-                <a:hlinkClick r:id="rId5"/>
-              </a:rPr>
-              <a:t>R Graphics Cookbook, Winston Chang</a:t>
+              <a:t>magrittr of tidyverse?</a:t>
             </a:r>
           </a:p>
         </p:txBody>
@@ -4796,7 +4876,7 @@
             </a:pPr>
             <a:r>
               <a:rPr/>
-              <a:t>References (links do dplyr, ggplot2 e magrittr)</a:t>
+              <a:t>Reference: cheat sheet</a:t>
             </a:r>
           </a:p>
         </p:txBody>
@@ -4820,10 +4900,14 @@
               <a:buAutoNum type="arabicParenR"/>
             </a:pPr>
             <a:r>
+              <a:rPr/>
+              <a:t>Link: </a:t>
+            </a:r>
+            <a:r>
               <a:rPr>
                 <a:hlinkClick r:id="rId2"/>
               </a:rPr>
-              <a:t>Link: dplyr do tidyverse</a:t>
+              <a:t>Data visualization with ggplot2</a:t>
             </a:r>
           </a:p>
           <a:p>
@@ -4831,10 +4915,14 @@
               <a:buAutoNum type="arabicParenR"/>
             </a:pPr>
             <a:r>
+              <a:rPr/>
+              <a:t>Link: </a:t>
+            </a:r>
+            <a:r>
               <a:rPr>
                 <a:hlinkClick r:id="rId3"/>
               </a:rPr>
-              <a:t>Link: ggplot2 do tidyverse</a:t>
+              <a:t>Data transformation with dplyr</a:t>
             </a:r>
           </a:p>
           <a:p>
@@ -4842,117 +4930,29 @@
               <a:buAutoNum type="arabicParenR"/>
             </a:pPr>
             <a:r>
+              <a:rPr/>
+              <a:t>Link: </a:t>
+            </a:r>
+            <a:r>
               <a:rPr>
                 <a:hlinkClick r:id="rId4"/>
               </a:rPr>
-              <a:t>Link: magrittr do tidyverse?</a:t>
-            </a:r>
-          </a:p>
-        </p:txBody>
-      </p:sp>
-    </p:spTree>
-  </p:cSld>
-</p:sld>
-</file>
-
-<file path=ppt/slides/slide25.xml><?xml version="1.0" encoding="utf-8"?>
-<p:sld xmlns:a="http://schemas.openxmlformats.org/drawingml/2006/main" xmlns:r="http://schemas.openxmlformats.org/officeDocument/2006/relationships" xmlns:p="http://schemas.openxmlformats.org/presentationml/2006/main">
-  <p:cSld>
-    <p:spTree>
-      <p:nvGrpSpPr>
-        <p:cNvPr id="1" name=""/>
-        <p:cNvGrpSpPr/>
-        <p:nvPr/>
-      </p:nvGrpSpPr>
-      <p:grpSpPr>
-        <a:xfrm>
-          <a:off x="0" y="0"/>
-          <a:ext cx="0" cy="0"/>
-          <a:chOff x="0" y="0"/>
-          <a:chExt cx="0" cy="0"/>
-        </a:xfrm>
-      </p:grpSpPr>
-      <p:sp>
-        <p:nvSpPr>
-          <p:cNvPr id="2" name="Title 1"/>
-          <p:cNvSpPr>
-            <a:spLocks noGrp="1"/>
-          </p:cNvSpPr>
-          <p:nvPr>
-            <p:ph type="title"/>
-          </p:nvPr>
-        </p:nvSpPr>
-        <p:spPr/>
-        <p:txBody>
-          <a:bodyPr/>
-          <a:lstStyle/>
-          <a:p>
-            <a:pPr lvl="0" indent="0" marL="0">
-              <a:buNone/>
-            </a:pPr>
-            <a:r>
-              <a:rPr/>
-              <a:t>Reference: cheat sheet</a:t>
-            </a:r>
-          </a:p>
-        </p:txBody>
-      </p:sp>
-      <p:sp>
-        <p:nvSpPr>
-          <p:cNvPr id="3" name="Content Placeholder 2"/>
-          <p:cNvSpPr>
-            <a:spLocks noGrp="1"/>
-          </p:cNvSpPr>
-          <p:nvPr>
-            <p:ph idx="1"/>
-          </p:nvPr>
-        </p:nvSpPr>
-        <p:spPr/>
-        <p:txBody>
-          <a:bodyPr/>
-          <a:lstStyle/>
+              <a:t>Rmarkdown</a:t>
+            </a:r>
+          </a:p>
           <a:p>
             <a:pPr lvl="0" indent="-342900" marL="342900">
               <a:buAutoNum type="arabicParenR"/>
             </a:pPr>
             <a:r>
-              <a:rPr>
-                <a:hlinkClick r:id="rId2"/>
-              </a:rPr>
-              <a:t>Link Data visualization with ggplot2</a:t>
-            </a:r>
-          </a:p>
-          <a:p>
-            <a:pPr lvl="0" indent="-342900" marL="342900">
-              <a:buAutoNum type="arabicParenR"/>
-            </a:pPr>
-            <a:r>
-              <a:rPr>
-                <a:hlinkClick r:id="rId3"/>
-              </a:rPr>
-              <a:t>Link Data transformation with dplyr</a:t>
-            </a:r>
-          </a:p>
-          <a:p>
-            <a:pPr lvl="0" indent="-342900" marL="342900">
-              <a:buAutoNum type="arabicParenR"/>
-            </a:pPr>
-            <a:r>
-              <a:rPr>
-                <a:hlinkClick r:id="rId4"/>
-              </a:rPr>
-              <a:t>Link Rmarkdown</a:t>
-            </a:r>
-          </a:p>
-          <a:p>
-            <a:pPr lvl="0" indent="-342900" marL="342900">
-              <a:buAutoNum type="arabicParenR"/>
-            </a:pPr>
+              <a:rPr/>
+              <a:t>Link: </a:t>
+            </a:r>
             <a:r>
               <a:rPr>
                 <a:hlinkClick r:id="rId5"/>
               </a:rPr>
-              <a:t>Link Rstudio IDE</a:t>
+              <a:t>Rstudio IDE</a:t>
             </a:r>
           </a:p>
         </p:txBody>

</xml_diff>